<commit_message>
Added work flow file
</commit_message>
<xml_diff>
--- a/ML_Workshop.pptx
+++ b/ML_Workshop.pptx
@@ -7,14 +7,21 @@
   <p:sldIdLst>
     <p:sldId id="256" r:id="rId2"/>
     <p:sldId id="257" r:id="rId3"/>
-    <p:sldId id="258" r:id="rId4"/>
-    <p:sldId id="262" r:id="rId5"/>
-    <p:sldId id="263" r:id="rId6"/>
-    <p:sldId id="264" r:id="rId7"/>
-    <p:sldId id="265" r:id="rId8"/>
-    <p:sldId id="259" r:id="rId9"/>
-    <p:sldId id="260" r:id="rId10"/>
-    <p:sldId id="261" r:id="rId11"/>
+    <p:sldId id="262" r:id="rId4"/>
+    <p:sldId id="259" r:id="rId5"/>
+    <p:sldId id="260" r:id="rId6"/>
+    <p:sldId id="261" r:id="rId7"/>
+    <p:sldId id="263" r:id="rId8"/>
+    <p:sldId id="264" r:id="rId9"/>
+    <p:sldId id="265" r:id="rId10"/>
+    <p:sldId id="273" r:id="rId11"/>
+    <p:sldId id="266" r:id="rId12"/>
+    <p:sldId id="267" r:id="rId13"/>
+    <p:sldId id="268" r:id="rId14"/>
+    <p:sldId id="269" r:id="rId15"/>
+    <p:sldId id="270" r:id="rId16"/>
+    <p:sldId id="271" r:id="rId17"/>
+    <p:sldId id="272" r:id="rId18"/>
   </p:sldIdLst>
   <p:sldSz cx="12192000" cy="6858000"/>
   <p:notesSz cx="6858000" cy="9144000"/>
@@ -7788,7 +7795,7 @@
           <p:cNvPr id="2" name="Title 1">
             <a:extLst>
               <a:ext uri="{FF2B5EF4-FFF2-40B4-BE49-F238E27FC236}">
-                <a16:creationId xmlns:a16="http://schemas.microsoft.com/office/drawing/2014/main" id="{6ABE32CE-4722-8445-B270-1ABF2A108399}"/>
+                <a16:creationId xmlns:a16="http://schemas.microsoft.com/office/drawing/2014/main" id="{0A8863FB-A93B-A649-8FF5-9D263E39E874}"/>
               </a:ext>
             </a:extLst>
           </p:cNvPr>
@@ -7806,7 +7813,7 @@
           <a:p>
             <a:r>
               <a:rPr lang="en-US" b="1" dirty="0"/>
-              <a:t>Convolution Layer</a:t>
+              <a:t>Resources</a:t>
             </a:r>
           </a:p>
         </p:txBody>
@@ -7816,7 +7823,7 @@
           <p:cNvPr id="3" name="Content Placeholder 2">
             <a:extLst>
               <a:ext uri="{FF2B5EF4-FFF2-40B4-BE49-F238E27FC236}">
-                <a16:creationId xmlns:a16="http://schemas.microsoft.com/office/drawing/2014/main" id="{C74A1B5E-BD55-3342-89D7-F685D953B7A5}"/>
+                <a16:creationId xmlns:a16="http://schemas.microsoft.com/office/drawing/2014/main" id="{0709BFED-DAAE-8B48-9721-3CC0CD1A4473}"/>
               </a:ext>
             </a:extLst>
           </p:cNvPr>
@@ -7829,31 +7836,69 @@
         </p:nvSpPr>
         <p:spPr>
           <a:xfrm>
-            <a:off x="2509699" y="1739348"/>
-            <a:ext cx="8915400" cy="4830417"/>
+            <a:off x="1326942" y="2133599"/>
+            <a:ext cx="10083180" cy="4028661"/>
           </a:xfrm>
         </p:spPr>
         <p:txBody>
-          <a:bodyPr>
-            <a:normAutofit fontScale="92500" lnSpcReduction="10000"/>
-          </a:bodyPr>
+          <a:bodyPr/>
           <a:lstStyle/>
           <a:p>
             <a:r>
-              <a:rPr lang="en-US" sz="2400" dirty="0"/>
-              <a:t>Convolution layers (the use of a filter to create a feature map) run from 1D to 3D and include the most common variants, such as cropping and transposed convolution layers for each dimensionality. 2D convolution, which was inspired by the functionality of the visual cortex, is commonly used for image recognition.</a:t>
+              <a:rPr lang="en-US" dirty="0"/>
+              <a:t>1. Google TensorFlow Documentation</a:t>
             </a:r>
           </a:p>
           <a:p>
             <a:pPr marL="0" indent="0">
               <a:buNone/>
             </a:pPr>
-            <a:endParaRPr lang="en-US" sz="2400" dirty="0"/>
-          </a:p>
-          <a:p>
-            <a:r>
-              <a:rPr lang="en-US" sz="2400" dirty="0"/>
-              <a:t>Pooling (downscaling) layers run from 1D to 3D and include the most common variants, such as max and average pooling. Locally connected layers act like convolution layers, except that the weights are unshared. Recurrent layers include simple (fully connected recurrence), gated, LSTM, and others; these are useful for language processing, among other applications. Noise layers help to avoid overfitting.</a:t>
+            <a:r>
+              <a:rPr lang="en-US" dirty="0"/>
+              <a:t>          </a:t>
+            </a:r>
+            <a:r>
+              <a:rPr lang="en-US" dirty="0">
+                <a:hlinkClick r:id="rId2"/>
+              </a:rPr>
+              <a:t>https://www.tensorflow.org/tutorials</a:t>
+            </a:r>
+            <a:endParaRPr lang="en-US" dirty="0"/>
+          </a:p>
+          <a:p>
+            <a:r>
+              <a:rPr lang="en-US" dirty="0"/>
+              <a:t>2. TensorFlow </a:t>
+            </a:r>
+            <a:r>
+              <a:rPr lang="en-US" dirty="0" err="1"/>
+              <a:t>Keras</a:t>
+            </a:r>
+            <a:r>
+              <a:rPr lang="en-US" dirty="0"/>
+              <a:t> Documentation</a:t>
+            </a:r>
+          </a:p>
+          <a:p>
+            <a:pPr marL="0" indent="0">
+              <a:buNone/>
+            </a:pPr>
+            <a:r>
+              <a:rPr lang="en-US" dirty="0"/>
+              <a:t>          </a:t>
+            </a:r>
+            <a:r>
+              <a:rPr lang="en-US" dirty="0">
+                <a:hlinkClick r:id="rId3"/>
+              </a:rPr>
+              <a:t>https://www.tensorflow.org/guide/keras</a:t>
+            </a:r>
+            <a:endParaRPr lang="en-US" dirty="0"/>
+          </a:p>
+          <a:p>
+            <a:r>
+              <a:rPr lang="en-US" dirty="0"/>
+              <a:t>3. Neural Network Concepts</a:t>
             </a:r>
           </a:p>
           <a:p>
@@ -7864,7 +7909,1024 @@
     </p:spTree>
     <p:extLst>
       <p:ext uri="{BB962C8B-B14F-4D97-AF65-F5344CB8AC3E}">
-        <p14:creationId xmlns:p14="http://schemas.microsoft.com/office/powerpoint/2010/main" val="1539290060"/>
+        <p14:creationId xmlns:p14="http://schemas.microsoft.com/office/powerpoint/2010/main" val="461499981"/>
+      </p:ext>
+    </p:extLst>
+  </p:cSld>
+  <p:clrMapOvr>
+    <a:masterClrMapping/>
+  </p:clrMapOvr>
+</p:sld>
+</file>
+
+<file path=ppt/slides/slide11.xml><?xml version="1.0" encoding="utf-8"?>
+<p:sld xmlns:a="http://schemas.openxmlformats.org/drawingml/2006/main" xmlns:r="http://schemas.openxmlformats.org/officeDocument/2006/relationships" xmlns:p="http://schemas.openxmlformats.org/presentationml/2006/main">
+  <p:cSld>
+    <p:spTree>
+      <p:nvGrpSpPr>
+        <p:cNvPr id="1" name=""/>
+        <p:cNvGrpSpPr/>
+        <p:nvPr/>
+      </p:nvGrpSpPr>
+      <p:grpSpPr>
+        <a:xfrm>
+          <a:off x="0" y="0"/>
+          <a:ext cx="0" cy="0"/>
+          <a:chOff x="0" y="0"/>
+          <a:chExt cx="0" cy="0"/>
+        </a:xfrm>
+      </p:grpSpPr>
+      <p:sp>
+        <p:nvSpPr>
+          <p:cNvPr id="2" name="Title 1">
+            <a:extLst>
+              <a:ext uri="{FF2B5EF4-FFF2-40B4-BE49-F238E27FC236}">
+                <a16:creationId xmlns:a16="http://schemas.microsoft.com/office/drawing/2014/main" id="{80DAE267-3389-CF4D-AE6D-FFD39AE70BCD}"/>
+              </a:ext>
+            </a:extLst>
+          </p:cNvPr>
+          <p:cNvSpPr>
+            <a:spLocks noGrp="1"/>
+          </p:cNvSpPr>
+          <p:nvPr>
+            <p:ph type="title"/>
+          </p:nvPr>
+        </p:nvSpPr>
+        <p:spPr/>
+        <p:txBody>
+          <a:bodyPr/>
+          <a:lstStyle/>
+          <a:p>
+            <a:r>
+              <a:rPr lang="en-US" b="1" dirty="0"/>
+              <a:t>What is Activation Function</a:t>
+            </a:r>
+          </a:p>
+        </p:txBody>
+      </p:sp>
+      <p:sp>
+        <p:nvSpPr>
+          <p:cNvPr id="3" name="Content Placeholder 2">
+            <a:extLst>
+              <a:ext uri="{FF2B5EF4-FFF2-40B4-BE49-F238E27FC236}">
+                <a16:creationId xmlns:a16="http://schemas.microsoft.com/office/drawing/2014/main" id="{E597EA87-1496-6B46-9F38-8DA2C0EE19F7}"/>
+              </a:ext>
+            </a:extLst>
+          </p:cNvPr>
+          <p:cNvSpPr>
+            <a:spLocks noGrp="1"/>
+          </p:cNvSpPr>
+          <p:nvPr>
+            <p:ph idx="1"/>
+          </p:nvPr>
+        </p:nvSpPr>
+        <p:spPr/>
+        <p:txBody>
+          <a:bodyPr>
+            <a:normAutofit/>
+          </a:bodyPr>
+          <a:lstStyle/>
+          <a:p>
+            <a:r>
+              <a:rPr lang="en-US" sz="2400" dirty="0"/>
+              <a:t>Activation function is nothing but </a:t>
+            </a:r>
+            <a:r>
+              <a:rPr lang="en-US" sz="2400" u="sng" dirty="0"/>
+              <a:t>a mathematical function</a:t>
+            </a:r>
+            <a:r>
+              <a:rPr lang="en-US" sz="2400" dirty="0"/>
+              <a:t> that takes in an input and produces an output. The function is activated when the computed result reaches the specified threshold.</a:t>
+            </a:r>
+          </a:p>
+        </p:txBody>
+      </p:sp>
+      <p:pic>
+        <p:nvPicPr>
+          <p:cNvPr id="4" name="Picture 3">
+            <a:extLst>
+              <a:ext uri="{FF2B5EF4-FFF2-40B4-BE49-F238E27FC236}">
+                <a16:creationId xmlns:a16="http://schemas.microsoft.com/office/drawing/2014/main" id="{E4DDADCB-6A5C-ED46-91E6-5807E496900D}"/>
+              </a:ext>
+            </a:extLst>
+          </p:cNvPr>
+          <p:cNvPicPr>
+            <a:picLocks noChangeAspect="1"/>
+          </p:cNvPicPr>
+          <p:nvPr/>
+        </p:nvPicPr>
+        <p:blipFill>
+          <a:blip r:embed="rId2"/>
+          <a:stretch>
+            <a:fillRect/>
+          </a:stretch>
+        </p:blipFill>
+        <p:spPr>
+          <a:xfrm>
+            <a:off x="2690949" y="4417060"/>
+            <a:ext cx="8516982" cy="1095466"/>
+          </a:xfrm>
+          <a:prstGeom prst="rect">
+            <a:avLst/>
+          </a:prstGeom>
+        </p:spPr>
+      </p:pic>
+    </p:spTree>
+    <p:extLst>
+      <p:ext uri="{BB962C8B-B14F-4D97-AF65-F5344CB8AC3E}">
+        <p14:creationId xmlns:p14="http://schemas.microsoft.com/office/powerpoint/2010/main" val="2955508453"/>
+      </p:ext>
+    </p:extLst>
+  </p:cSld>
+  <p:clrMapOvr>
+    <a:masterClrMapping/>
+  </p:clrMapOvr>
+</p:sld>
+</file>
+
+<file path=ppt/slides/slide12.xml><?xml version="1.0" encoding="utf-8"?>
+<p:sld xmlns:a="http://schemas.openxmlformats.org/drawingml/2006/main" xmlns:r="http://schemas.openxmlformats.org/officeDocument/2006/relationships" xmlns:p="http://schemas.openxmlformats.org/presentationml/2006/main">
+  <p:cSld>
+    <p:spTree>
+      <p:nvGrpSpPr>
+        <p:cNvPr id="1" name=""/>
+        <p:cNvGrpSpPr/>
+        <p:nvPr/>
+      </p:nvGrpSpPr>
+      <p:grpSpPr>
+        <a:xfrm>
+          <a:off x="0" y="0"/>
+          <a:ext cx="0" cy="0"/>
+          <a:chOff x="0" y="0"/>
+          <a:chExt cx="0" cy="0"/>
+        </a:xfrm>
+      </p:grpSpPr>
+      <p:sp>
+        <p:nvSpPr>
+          <p:cNvPr id="2" name="Title 1">
+            <a:extLst>
+              <a:ext uri="{FF2B5EF4-FFF2-40B4-BE49-F238E27FC236}">
+                <a16:creationId xmlns:a16="http://schemas.microsoft.com/office/drawing/2014/main" id="{287EB954-1CFA-8740-906A-8AE5BAE42F33}"/>
+              </a:ext>
+            </a:extLst>
+          </p:cNvPr>
+          <p:cNvSpPr>
+            <a:spLocks noGrp="1"/>
+          </p:cNvSpPr>
+          <p:nvPr>
+            <p:ph type="title"/>
+          </p:nvPr>
+        </p:nvSpPr>
+        <p:spPr/>
+        <p:txBody>
+          <a:bodyPr/>
+          <a:lstStyle/>
+          <a:p>
+            <a:r>
+              <a:rPr lang="en-US" b="1" dirty="0"/>
+              <a:t>Available Activation Functions</a:t>
+            </a:r>
+          </a:p>
+        </p:txBody>
+      </p:sp>
+      <p:sp>
+        <p:nvSpPr>
+          <p:cNvPr id="3" name="Content Placeholder 2">
+            <a:extLst>
+              <a:ext uri="{FF2B5EF4-FFF2-40B4-BE49-F238E27FC236}">
+                <a16:creationId xmlns:a16="http://schemas.microsoft.com/office/drawing/2014/main" id="{487DEA8D-5C59-F64D-B0D2-80B6DC5918F2}"/>
+              </a:ext>
+            </a:extLst>
+          </p:cNvPr>
+          <p:cNvSpPr>
+            <a:spLocks noGrp="1"/>
+          </p:cNvSpPr>
+          <p:nvPr>
+            <p:ph idx="1"/>
+          </p:nvPr>
+        </p:nvSpPr>
+        <p:spPr/>
+        <p:txBody>
+          <a:bodyPr/>
+          <a:lstStyle/>
+          <a:p>
+            <a:endParaRPr lang="en-US" dirty="0"/>
+          </a:p>
+        </p:txBody>
+      </p:sp>
+      <p:pic>
+        <p:nvPicPr>
+          <p:cNvPr id="4" name="Picture 3">
+            <a:extLst>
+              <a:ext uri="{FF2B5EF4-FFF2-40B4-BE49-F238E27FC236}">
+                <a16:creationId xmlns:a16="http://schemas.microsoft.com/office/drawing/2014/main" id="{33B60B6D-4B64-2543-9F5E-F0157E8256A9}"/>
+              </a:ext>
+            </a:extLst>
+          </p:cNvPr>
+          <p:cNvPicPr>
+            <a:picLocks noChangeAspect="1"/>
+          </p:cNvPicPr>
+          <p:nvPr/>
+        </p:nvPicPr>
+        <p:blipFill>
+          <a:blip r:embed="rId2"/>
+          <a:stretch>
+            <a:fillRect/>
+          </a:stretch>
+        </p:blipFill>
+        <p:spPr>
+          <a:xfrm>
+            <a:off x="2589211" y="1962149"/>
+            <a:ext cx="9062857" cy="4699907"/>
+          </a:xfrm>
+          <a:prstGeom prst="rect">
+            <a:avLst/>
+          </a:prstGeom>
+        </p:spPr>
+      </p:pic>
+    </p:spTree>
+    <p:extLst>
+      <p:ext uri="{BB962C8B-B14F-4D97-AF65-F5344CB8AC3E}">
+        <p14:creationId xmlns:p14="http://schemas.microsoft.com/office/powerpoint/2010/main" val="3557880874"/>
+      </p:ext>
+    </p:extLst>
+  </p:cSld>
+  <p:clrMapOvr>
+    <a:masterClrMapping/>
+  </p:clrMapOvr>
+</p:sld>
+</file>
+
+<file path=ppt/slides/slide13.xml><?xml version="1.0" encoding="utf-8"?>
+<p:sld xmlns:a="http://schemas.openxmlformats.org/drawingml/2006/main" xmlns:r="http://schemas.openxmlformats.org/officeDocument/2006/relationships" xmlns:p="http://schemas.openxmlformats.org/presentationml/2006/main">
+  <p:cSld>
+    <p:spTree>
+      <p:nvGrpSpPr>
+        <p:cNvPr id="1" name=""/>
+        <p:cNvGrpSpPr/>
+        <p:nvPr/>
+      </p:nvGrpSpPr>
+      <p:grpSpPr>
+        <a:xfrm>
+          <a:off x="0" y="0"/>
+          <a:ext cx="0" cy="0"/>
+          <a:chOff x="0" y="0"/>
+          <a:chExt cx="0" cy="0"/>
+        </a:xfrm>
+      </p:grpSpPr>
+      <p:sp>
+        <p:nvSpPr>
+          <p:cNvPr id="2" name="Title 1">
+            <a:extLst>
+              <a:ext uri="{FF2B5EF4-FFF2-40B4-BE49-F238E27FC236}">
+                <a16:creationId xmlns:a16="http://schemas.microsoft.com/office/drawing/2014/main" id="{6E64BF82-01BE-3840-AC3E-0265E05BA5F4}"/>
+              </a:ext>
+            </a:extLst>
+          </p:cNvPr>
+          <p:cNvSpPr>
+            <a:spLocks noGrp="1"/>
+          </p:cNvSpPr>
+          <p:nvPr>
+            <p:ph type="title"/>
+          </p:nvPr>
+        </p:nvSpPr>
+        <p:spPr/>
+        <p:txBody>
+          <a:bodyPr/>
+          <a:lstStyle/>
+          <a:p>
+            <a:r>
+              <a:rPr lang="en-US" b="1" dirty="0"/>
+              <a:t>Linear Activation Function</a:t>
+            </a:r>
+            <a:br>
+              <a:rPr lang="en-US" b="1" dirty="0"/>
+            </a:br>
+            <a:endParaRPr lang="en-US" dirty="0"/>
+          </a:p>
+        </p:txBody>
+      </p:sp>
+      <p:sp>
+        <p:nvSpPr>
+          <p:cNvPr id="3" name="Content Placeholder 2">
+            <a:extLst>
+              <a:ext uri="{FF2B5EF4-FFF2-40B4-BE49-F238E27FC236}">
+                <a16:creationId xmlns:a16="http://schemas.microsoft.com/office/drawing/2014/main" id="{54624C06-C107-0E45-90D5-33BC3F10AD6C}"/>
+              </a:ext>
+            </a:extLst>
+          </p:cNvPr>
+          <p:cNvSpPr>
+            <a:spLocks noGrp="1"/>
+          </p:cNvSpPr>
+          <p:nvPr>
+            <p:ph idx="1"/>
+          </p:nvPr>
+        </p:nvSpPr>
+        <p:spPr/>
+        <p:txBody>
+          <a:bodyPr>
+            <a:normAutofit/>
+          </a:bodyPr>
+          <a:lstStyle/>
+          <a:p>
+            <a:r>
+              <a:rPr lang="en-US" sz="2400" dirty="0"/>
+              <a:t>The activation function simply scales an input by a factor, implying that there is a linear relationship between the inputs and the output.</a:t>
+            </a:r>
+          </a:p>
+        </p:txBody>
+      </p:sp>
+      <p:pic>
+        <p:nvPicPr>
+          <p:cNvPr id="4" name="Picture 3">
+            <a:extLst>
+              <a:ext uri="{FF2B5EF4-FFF2-40B4-BE49-F238E27FC236}">
+                <a16:creationId xmlns:a16="http://schemas.microsoft.com/office/drawing/2014/main" id="{3047713E-8903-204D-A086-04BFCC08D6E0}"/>
+              </a:ext>
+            </a:extLst>
+          </p:cNvPr>
+          <p:cNvPicPr>
+            <a:picLocks noChangeAspect="1"/>
+          </p:cNvPicPr>
+          <p:nvPr/>
+        </p:nvPicPr>
+        <p:blipFill>
+          <a:blip r:embed="rId2"/>
+          <a:stretch>
+            <a:fillRect/>
+          </a:stretch>
+        </p:blipFill>
+        <p:spPr>
+          <a:xfrm>
+            <a:off x="3122023" y="4022410"/>
+            <a:ext cx="5486400" cy="1620743"/>
+          </a:xfrm>
+          <a:prstGeom prst="rect">
+            <a:avLst/>
+          </a:prstGeom>
+        </p:spPr>
+      </p:pic>
+    </p:spTree>
+    <p:extLst>
+      <p:ext uri="{BB962C8B-B14F-4D97-AF65-F5344CB8AC3E}">
+        <p14:creationId xmlns:p14="http://schemas.microsoft.com/office/powerpoint/2010/main" val="3005283652"/>
+      </p:ext>
+    </p:extLst>
+  </p:cSld>
+  <p:clrMapOvr>
+    <a:masterClrMapping/>
+  </p:clrMapOvr>
+</p:sld>
+</file>
+
+<file path=ppt/slides/slide14.xml><?xml version="1.0" encoding="utf-8"?>
+<p:sld xmlns:a="http://schemas.openxmlformats.org/drawingml/2006/main" xmlns:r="http://schemas.openxmlformats.org/officeDocument/2006/relationships" xmlns:p="http://schemas.openxmlformats.org/presentationml/2006/main">
+  <p:cSld>
+    <p:spTree>
+      <p:nvGrpSpPr>
+        <p:cNvPr id="1" name=""/>
+        <p:cNvGrpSpPr/>
+        <p:nvPr/>
+      </p:nvGrpSpPr>
+      <p:grpSpPr>
+        <a:xfrm>
+          <a:off x="0" y="0"/>
+          <a:ext cx="0" cy="0"/>
+          <a:chOff x="0" y="0"/>
+          <a:chExt cx="0" cy="0"/>
+        </a:xfrm>
+      </p:grpSpPr>
+      <p:sp>
+        <p:nvSpPr>
+          <p:cNvPr id="2" name="Title 1">
+            <a:extLst>
+              <a:ext uri="{FF2B5EF4-FFF2-40B4-BE49-F238E27FC236}">
+                <a16:creationId xmlns:a16="http://schemas.microsoft.com/office/drawing/2014/main" id="{B45005CF-8048-3E4B-B3FF-56EBA435FCB0}"/>
+              </a:ext>
+            </a:extLst>
+          </p:cNvPr>
+          <p:cNvSpPr>
+            <a:spLocks noGrp="1"/>
+          </p:cNvSpPr>
+          <p:nvPr>
+            <p:ph type="title"/>
+          </p:nvPr>
+        </p:nvSpPr>
+        <p:spPr/>
+        <p:txBody>
+          <a:bodyPr/>
+          <a:lstStyle/>
+          <a:p>
+            <a:r>
+              <a:rPr lang="en-US" b="1" dirty="0"/>
+              <a:t>Sigmoid Activation Function</a:t>
+            </a:r>
+            <a:br>
+              <a:rPr lang="en-US" b="1" dirty="0"/>
+            </a:br>
+            <a:endParaRPr lang="en-US" dirty="0"/>
+          </a:p>
+        </p:txBody>
+      </p:sp>
+      <p:sp>
+        <p:nvSpPr>
+          <p:cNvPr id="3" name="Content Placeholder 2">
+            <a:extLst>
+              <a:ext uri="{FF2B5EF4-FFF2-40B4-BE49-F238E27FC236}">
+                <a16:creationId xmlns:a16="http://schemas.microsoft.com/office/drawing/2014/main" id="{4DC0CFC3-4F43-DC4D-8621-CF23D3DE3A49}"/>
+              </a:ext>
+            </a:extLst>
+          </p:cNvPr>
+          <p:cNvSpPr>
+            <a:spLocks noGrp="1"/>
+          </p:cNvSpPr>
+          <p:nvPr>
+            <p:ph idx="1"/>
+          </p:nvPr>
+        </p:nvSpPr>
+        <p:spPr>
+          <a:xfrm>
+            <a:off x="1461052" y="2133600"/>
+            <a:ext cx="10043560" cy="3777622"/>
+          </a:xfrm>
+        </p:spPr>
+        <p:txBody>
+          <a:bodyPr>
+            <a:normAutofit/>
+          </a:bodyPr>
+          <a:lstStyle/>
+          <a:p>
+            <a:r>
+              <a:rPr lang="en-US" sz="2400" dirty="0"/>
+              <a:t>The sigmoid activation function is “S” shaped. It can add non-linearity to the output and returns a binary value of 0 or 1.</a:t>
+            </a:r>
+          </a:p>
+        </p:txBody>
+      </p:sp>
+      <p:pic>
+        <p:nvPicPr>
+          <p:cNvPr id="4" name="Picture 3">
+            <a:extLst>
+              <a:ext uri="{FF2B5EF4-FFF2-40B4-BE49-F238E27FC236}">
+                <a16:creationId xmlns:a16="http://schemas.microsoft.com/office/drawing/2014/main" id="{58993ECF-4FAD-4A4F-8DA5-1196981493D9}"/>
+              </a:ext>
+            </a:extLst>
+          </p:cNvPr>
+          <p:cNvPicPr>
+            <a:picLocks noChangeAspect="1"/>
+          </p:cNvPicPr>
+          <p:nvPr/>
+        </p:nvPicPr>
+        <p:blipFill>
+          <a:blip r:embed="rId2"/>
+          <a:stretch>
+            <a:fillRect/>
+          </a:stretch>
+        </p:blipFill>
+        <p:spPr>
+          <a:xfrm>
+            <a:off x="1735000" y="4075611"/>
+            <a:ext cx="3046005" cy="1619795"/>
+          </a:xfrm>
+          <a:prstGeom prst="rect">
+            <a:avLst/>
+          </a:prstGeom>
+        </p:spPr>
+      </p:pic>
+      <p:pic>
+        <p:nvPicPr>
+          <p:cNvPr id="5" name="Picture 4">
+            <a:extLst>
+              <a:ext uri="{FF2B5EF4-FFF2-40B4-BE49-F238E27FC236}">
+                <a16:creationId xmlns:a16="http://schemas.microsoft.com/office/drawing/2014/main" id="{F60B3771-F0C4-E64D-8CEA-20E541E89FFD}"/>
+              </a:ext>
+            </a:extLst>
+          </p:cNvPr>
+          <p:cNvPicPr>
+            <a:picLocks noChangeAspect="1"/>
+          </p:cNvPicPr>
+          <p:nvPr/>
+        </p:nvPicPr>
+        <p:blipFill>
+          <a:blip r:embed="rId3"/>
+          <a:stretch>
+            <a:fillRect/>
+          </a:stretch>
+        </p:blipFill>
+        <p:spPr>
+          <a:xfrm>
+            <a:off x="6635931" y="3429000"/>
+            <a:ext cx="3681367" cy="2710822"/>
+          </a:xfrm>
+          <a:prstGeom prst="rect">
+            <a:avLst/>
+          </a:prstGeom>
+        </p:spPr>
+      </p:pic>
+    </p:spTree>
+    <p:extLst>
+      <p:ext uri="{BB962C8B-B14F-4D97-AF65-F5344CB8AC3E}">
+        <p14:creationId xmlns:p14="http://schemas.microsoft.com/office/powerpoint/2010/main" val="2849309424"/>
+      </p:ext>
+    </p:extLst>
+  </p:cSld>
+  <p:clrMapOvr>
+    <a:masterClrMapping/>
+  </p:clrMapOvr>
+</p:sld>
+</file>
+
+<file path=ppt/slides/slide15.xml><?xml version="1.0" encoding="utf-8"?>
+<p:sld xmlns:a="http://schemas.openxmlformats.org/drawingml/2006/main" xmlns:r="http://schemas.openxmlformats.org/officeDocument/2006/relationships" xmlns:p="http://schemas.openxmlformats.org/presentationml/2006/main">
+  <p:cSld>
+    <p:spTree>
+      <p:nvGrpSpPr>
+        <p:cNvPr id="1" name=""/>
+        <p:cNvGrpSpPr/>
+        <p:nvPr/>
+      </p:nvGrpSpPr>
+      <p:grpSpPr>
+        <a:xfrm>
+          <a:off x="0" y="0"/>
+          <a:ext cx="0" cy="0"/>
+          <a:chOff x="0" y="0"/>
+          <a:chExt cx="0" cy="0"/>
+        </a:xfrm>
+      </p:grpSpPr>
+      <p:sp>
+        <p:nvSpPr>
+          <p:cNvPr id="2" name="Title 1">
+            <a:extLst>
+              <a:ext uri="{FF2B5EF4-FFF2-40B4-BE49-F238E27FC236}">
+                <a16:creationId xmlns:a16="http://schemas.microsoft.com/office/drawing/2014/main" id="{1D307C98-137D-8141-ACB9-CA20429D8CD1}"/>
+              </a:ext>
+            </a:extLst>
+          </p:cNvPr>
+          <p:cNvSpPr>
+            <a:spLocks noGrp="1"/>
+          </p:cNvSpPr>
+          <p:nvPr>
+            <p:ph type="title"/>
+          </p:nvPr>
+        </p:nvSpPr>
+        <p:spPr/>
+        <p:txBody>
+          <a:bodyPr/>
+          <a:lstStyle/>
+          <a:p>
+            <a:r>
+              <a:rPr lang="en-US" b="1" dirty="0"/>
+              <a:t>Tanh Activation Function</a:t>
+            </a:r>
+            <a:br>
+              <a:rPr lang="en-US" b="1" dirty="0"/>
+            </a:br>
+            <a:endParaRPr lang="en-US" dirty="0"/>
+          </a:p>
+        </p:txBody>
+      </p:sp>
+      <p:sp>
+        <p:nvSpPr>
+          <p:cNvPr id="3" name="Content Placeholder 2">
+            <a:extLst>
+              <a:ext uri="{FF2B5EF4-FFF2-40B4-BE49-F238E27FC236}">
+                <a16:creationId xmlns:a16="http://schemas.microsoft.com/office/drawing/2014/main" id="{6FB30003-97E4-8049-A3BB-D6E629FF8695}"/>
+              </a:ext>
+            </a:extLst>
+          </p:cNvPr>
+          <p:cNvSpPr>
+            <a:spLocks noGrp="1"/>
+          </p:cNvSpPr>
+          <p:nvPr>
+            <p:ph idx="1"/>
+          </p:nvPr>
+        </p:nvSpPr>
+        <p:spPr>
+          <a:xfrm>
+            <a:off x="949255" y="2143538"/>
+            <a:ext cx="10421109" cy="4465984"/>
+          </a:xfrm>
+        </p:spPr>
+        <p:txBody>
+          <a:bodyPr>
+            <a:normAutofit/>
+          </a:bodyPr>
+          <a:lstStyle/>
+          <a:p>
+            <a:r>
+              <a:rPr lang="en-US" sz="2400" dirty="0"/>
+              <a:t>Tanh is an extension of the sigmoid activation function. Hence Tanh can be used to add non-linearity to the output. The output is within the range of -1 to 1. Tanh function shifts the result of the sigmoid activation function.</a:t>
+            </a:r>
+          </a:p>
+        </p:txBody>
+      </p:sp>
+      <p:pic>
+        <p:nvPicPr>
+          <p:cNvPr id="4" name="Picture 3">
+            <a:extLst>
+              <a:ext uri="{FF2B5EF4-FFF2-40B4-BE49-F238E27FC236}">
+                <a16:creationId xmlns:a16="http://schemas.microsoft.com/office/drawing/2014/main" id="{8BD4221D-677C-B140-A22F-643F9B969435}"/>
+              </a:ext>
+            </a:extLst>
+          </p:cNvPr>
+          <p:cNvPicPr>
+            <a:picLocks noChangeAspect="1"/>
+          </p:cNvPicPr>
+          <p:nvPr/>
+        </p:nvPicPr>
+        <p:blipFill>
+          <a:blip r:embed="rId2"/>
+          <a:stretch>
+            <a:fillRect/>
+          </a:stretch>
+        </p:blipFill>
+        <p:spPr>
+          <a:xfrm>
+            <a:off x="1201782" y="4392390"/>
+            <a:ext cx="3278777" cy="1378127"/>
+          </a:xfrm>
+          <a:prstGeom prst="rect">
+            <a:avLst/>
+          </a:prstGeom>
+        </p:spPr>
+      </p:pic>
+      <p:pic>
+        <p:nvPicPr>
+          <p:cNvPr id="5" name="Picture 4">
+            <a:extLst>
+              <a:ext uri="{FF2B5EF4-FFF2-40B4-BE49-F238E27FC236}">
+                <a16:creationId xmlns:a16="http://schemas.microsoft.com/office/drawing/2014/main" id="{ED0100D4-DA0F-1C4C-B306-D5AEAD893AFB}"/>
+              </a:ext>
+            </a:extLst>
+          </p:cNvPr>
+          <p:cNvPicPr>
+            <a:picLocks noChangeAspect="1"/>
+          </p:cNvPicPr>
+          <p:nvPr/>
+        </p:nvPicPr>
+        <p:blipFill>
+          <a:blip r:embed="rId3"/>
+          <a:stretch>
+            <a:fillRect/>
+          </a:stretch>
+        </p:blipFill>
+        <p:spPr>
+          <a:xfrm>
+            <a:off x="6413863" y="3827417"/>
+            <a:ext cx="4828882" cy="2406473"/>
+          </a:xfrm>
+          <a:prstGeom prst="rect">
+            <a:avLst/>
+          </a:prstGeom>
+        </p:spPr>
+      </p:pic>
+    </p:spTree>
+    <p:extLst>
+      <p:ext uri="{BB962C8B-B14F-4D97-AF65-F5344CB8AC3E}">
+        <p14:creationId xmlns:p14="http://schemas.microsoft.com/office/powerpoint/2010/main" val="2440067125"/>
+      </p:ext>
+    </p:extLst>
+  </p:cSld>
+  <p:clrMapOvr>
+    <a:masterClrMapping/>
+  </p:clrMapOvr>
+</p:sld>
+</file>
+
+<file path=ppt/slides/slide16.xml><?xml version="1.0" encoding="utf-8"?>
+<p:sld xmlns:a="http://schemas.openxmlformats.org/drawingml/2006/main" xmlns:r="http://schemas.openxmlformats.org/officeDocument/2006/relationships" xmlns:p="http://schemas.openxmlformats.org/presentationml/2006/main">
+  <p:cSld>
+    <p:spTree>
+      <p:nvGrpSpPr>
+        <p:cNvPr id="1" name=""/>
+        <p:cNvGrpSpPr/>
+        <p:nvPr/>
+      </p:nvGrpSpPr>
+      <p:grpSpPr>
+        <a:xfrm>
+          <a:off x="0" y="0"/>
+          <a:ext cx="0" cy="0"/>
+          <a:chOff x="0" y="0"/>
+          <a:chExt cx="0" cy="0"/>
+        </a:xfrm>
+      </p:grpSpPr>
+      <p:sp>
+        <p:nvSpPr>
+          <p:cNvPr id="2" name="Title 1">
+            <a:extLst>
+              <a:ext uri="{FF2B5EF4-FFF2-40B4-BE49-F238E27FC236}">
+                <a16:creationId xmlns:a16="http://schemas.microsoft.com/office/drawing/2014/main" id="{C18DC3AC-E3C9-1543-BE44-4091F823565E}"/>
+              </a:ext>
+            </a:extLst>
+          </p:cNvPr>
+          <p:cNvSpPr>
+            <a:spLocks noGrp="1"/>
+          </p:cNvSpPr>
+          <p:nvPr>
+            <p:ph type="title"/>
+          </p:nvPr>
+        </p:nvSpPr>
+        <p:spPr>
+          <a:xfrm>
+            <a:off x="1815737" y="624110"/>
+            <a:ext cx="9688875" cy="1280890"/>
+          </a:xfrm>
+        </p:spPr>
+        <p:txBody>
+          <a:bodyPr>
+            <a:normAutofit fontScale="90000"/>
+          </a:bodyPr>
+          <a:lstStyle/>
+          <a:p>
+            <a:r>
+              <a:rPr lang="en-US" b="1" dirty="0"/>
+              <a:t>Rectified Linear Unit Activation Function (RELU)</a:t>
+            </a:r>
+            <a:br>
+              <a:rPr lang="en-US" b="1" dirty="0"/>
+            </a:br>
+            <a:endParaRPr lang="en-US" dirty="0"/>
+          </a:p>
+        </p:txBody>
+      </p:sp>
+      <p:sp>
+        <p:nvSpPr>
+          <p:cNvPr id="3" name="Content Placeholder 2">
+            <a:extLst>
+              <a:ext uri="{FF2B5EF4-FFF2-40B4-BE49-F238E27FC236}">
+                <a16:creationId xmlns:a16="http://schemas.microsoft.com/office/drawing/2014/main" id="{E0C6BF26-F2E2-AB49-8B05-2A224F4F8F89}"/>
+              </a:ext>
+            </a:extLst>
+          </p:cNvPr>
+          <p:cNvSpPr>
+            <a:spLocks noGrp="1"/>
+          </p:cNvSpPr>
+          <p:nvPr>
+            <p:ph idx="1"/>
+          </p:nvPr>
+        </p:nvSpPr>
+        <p:spPr>
+          <a:xfrm>
+            <a:off x="1227909" y="1711234"/>
+            <a:ext cx="10698480" cy="4199988"/>
+          </a:xfrm>
+        </p:spPr>
+        <p:txBody>
+          <a:bodyPr/>
+          <a:lstStyle/>
+          <a:p>
+            <a:r>
+              <a:rPr lang="en-US" sz="2400" dirty="0"/>
+              <a:t>RELU is one of the most used activation functions. It is preferred to use RELU in the hidden layer. The concept is very straight forward. It also adds non-linearity to the output. However the result can range from 0 to infinity.</a:t>
+            </a:r>
+            <a:br>
+              <a:rPr lang="en-US" dirty="0"/>
+            </a:br>
+            <a:endParaRPr lang="en-US" dirty="0"/>
+          </a:p>
+          <a:p>
+            <a:endParaRPr lang="en-US" dirty="0"/>
+          </a:p>
+        </p:txBody>
+      </p:sp>
+      <p:pic>
+        <p:nvPicPr>
+          <p:cNvPr id="4" name="Picture 3">
+            <a:extLst>
+              <a:ext uri="{FF2B5EF4-FFF2-40B4-BE49-F238E27FC236}">
+                <a16:creationId xmlns:a16="http://schemas.microsoft.com/office/drawing/2014/main" id="{D2295964-68C8-CA4B-AF5F-1B79D157C0B3}"/>
+              </a:ext>
+            </a:extLst>
+          </p:cNvPr>
+          <p:cNvPicPr>
+            <a:picLocks noChangeAspect="1"/>
+          </p:cNvPicPr>
+          <p:nvPr/>
+        </p:nvPicPr>
+        <p:blipFill>
+          <a:blip r:embed="rId2"/>
+          <a:stretch>
+            <a:fillRect/>
+          </a:stretch>
+        </p:blipFill>
+        <p:spPr>
+          <a:xfrm>
+            <a:off x="1350371" y="4072705"/>
+            <a:ext cx="3992337" cy="1280890"/>
+          </a:xfrm>
+          <a:prstGeom prst="rect">
+            <a:avLst/>
+          </a:prstGeom>
+        </p:spPr>
+      </p:pic>
+      <p:pic>
+        <p:nvPicPr>
+          <p:cNvPr id="6" name="Picture 5">
+            <a:extLst>
+              <a:ext uri="{FF2B5EF4-FFF2-40B4-BE49-F238E27FC236}">
+                <a16:creationId xmlns:a16="http://schemas.microsoft.com/office/drawing/2014/main" id="{C2E96736-D4B5-A844-A205-0148A56E4969}"/>
+              </a:ext>
+            </a:extLst>
+          </p:cNvPr>
+          <p:cNvPicPr>
+            <a:picLocks noChangeAspect="1"/>
+          </p:cNvPicPr>
+          <p:nvPr/>
+        </p:nvPicPr>
+        <p:blipFill>
+          <a:blip r:embed="rId3"/>
+          <a:stretch>
+            <a:fillRect/>
+          </a:stretch>
+        </p:blipFill>
+        <p:spPr>
+          <a:xfrm>
+            <a:off x="6714309" y="3148149"/>
+            <a:ext cx="4790303" cy="2965268"/>
+          </a:xfrm>
+          <a:prstGeom prst="rect">
+            <a:avLst/>
+          </a:prstGeom>
+        </p:spPr>
+      </p:pic>
+    </p:spTree>
+    <p:extLst>
+      <p:ext uri="{BB962C8B-B14F-4D97-AF65-F5344CB8AC3E}">
+        <p14:creationId xmlns:p14="http://schemas.microsoft.com/office/powerpoint/2010/main" val="1507642564"/>
+      </p:ext>
+    </p:extLst>
+  </p:cSld>
+  <p:clrMapOvr>
+    <a:masterClrMapping/>
+  </p:clrMapOvr>
+</p:sld>
+</file>
+
+<file path=ppt/slides/slide17.xml><?xml version="1.0" encoding="utf-8"?>
+<p:sld xmlns:a="http://schemas.openxmlformats.org/drawingml/2006/main" xmlns:r="http://schemas.openxmlformats.org/officeDocument/2006/relationships" xmlns:p="http://schemas.openxmlformats.org/presentationml/2006/main">
+  <p:cSld>
+    <p:spTree>
+      <p:nvGrpSpPr>
+        <p:cNvPr id="1" name=""/>
+        <p:cNvGrpSpPr/>
+        <p:nvPr/>
+      </p:nvGrpSpPr>
+      <p:grpSpPr>
+        <a:xfrm>
+          <a:off x="0" y="0"/>
+          <a:ext cx="0" cy="0"/>
+          <a:chOff x="0" y="0"/>
+          <a:chExt cx="0" cy="0"/>
+        </a:xfrm>
+      </p:grpSpPr>
+      <p:sp>
+        <p:nvSpPr>
+          <p:cNvPr id="2" name="Title 1">
+            <a:extLst>
+              <a:ext uri="{FF2B5EF4-FFF2-40B4-BE49-F238E27FC236}">
+                <a16:creationId xmlns:a16="http://schemas.microsoft.com/office/drawing/2014/main" id="{B68864EE-0AE2-094B-B44F-7C840C587E6E}"/>
+              </a:ext>
+            </a:extLst>
+          </p:cNvPr>
+          <p:cNvSpPr>
+            <a:spLocks noGrp="1"/>
+          </p:cNvSpPr>
+          <p:nvPr>
+            <p:ph type="title"/>
+          </p:nvPr>
+        </p:nvSpPr>
+        <p:spPr/>
+        <p:txBody>
+          <a:bodyPr/>
+          <a:lstStyle/>
+          <a:p>
+            <a:r>
+              <a:rPr lang="en-US" b="1" dirty="0" err="1"/>
+              <a:t>Softmax</a:t>
+            </a:r>
+            <a:r>
+              <a:rPr lang="en-US" b="1" dirty="0"/>
+              <a:t> Activation Function</a:t>
+            </a:r>
+            <a:br>
+              <a:rPr lang="en-US" b="1" dirty="0"/>
+            </a:br>
+            <a:endParaRPr lang="en-US" dirty="0"/>
+          </a:p>
+        </p:txBody>
+      </p:sp>
+      <p:sp>
+        <p:nvSpPr>
+          <p:cNvPr id="3" name="Content Placeholder 2">
+            <a:extLst>
+              <a:ext uri="{FF2B5EF4-FFF2-40B4-BE49-F238E27FC236}">
+                <a16:creationId xmlns:a16="http://schemas.microsoft.com/office/drawing/2014/main" id="{9BFAEF4E-F8AF-5443-B59A-745D00DEEE99}"/>
+              </a:ext>
+            </a:extLst>
+          </p:cNvPr>
+          <p:cNvSpPr>
+            <a:spLocks noGrp="1"/>
+          </p:cNvSpPr>
+          <p:nvPr>
+            <p:ph idx="1"/>
+          </p:nvPr>
+        </p:nvSpPr>
+        <p:spPr>
+          <a:xfrm>
+            <a:off x="1679713" y="2133600"/>
+            <a:ext cx="9824899" cy="3777622"/>
+          </a:xfrm>
+        </p:spPr>
+        <p:txBody>
+          <a:bodyPr>
+            <a:normAutofit/>
+          </a:bodyPr>
+          <a:lstStyle/>
+          <a:p>
+            <a:r>
+              <a:rPr lang="en-US" sz="2400" dirty="0" err="1"/>
+              <a:t>Softmax</a:t>
+            </a:r>
+            <a:r>
+              <a:rPr lang="en-US" sz="2400" dirty="0"/>
+              <a:t> is an extension of the Sigmoid activation function. </a:t>
+            </a:r>
+            <a:r>
+              <a:rPr lang="en-US" sz="2400" dirty="0" err="1"/>
+              <a:t>Softmax</a:t>
+            </a:r>
+            <a:r>
+              <a:rPr lang="en-US" sz="2400" dirty="0"/>
+              <a:t> function adds non-linearity to the output, however it is mainly used for classification examples where multiple classes of results can be computed.</a:t>
+            </a:r>
+          </a:p>
+        </p:txBody>
+      </p:sp>
+      <p:pic>
+        <p:nvPicPr>
+          <p:cNvPr id="4" name="Picture 3">
+            <a:extLst>
+              <a:ext uri="{FF2B5EF4-FFF2-40B4-BE49-F238E27FC236}">
+                <a16:creationId xmlns:a16="http://schemas.microsoft.com/office/drawing/2014/main" id="{4F4C9D06-F304-2F40-B806-535C4DBE2809}"/>
+              </a:ext>
+            </a:extLst>
+          </p:cNvPr>
+          <p:cNvPicPr>
+            <a:picLocks noChangeAspect="1"/>
+          </p:cNvPicPr>
+          <p:nvPr/>
+        </p:nvPicPr>
+        <p:blipFill>
+          <a:blip r:embed="rId2"/>
+          <a:stretch>
+            <a:fillRect/>
+          </a:stretch>
+        </p:blipFill>
+        <p:spPr>
+          <a:xfrm>
+            <a:off x="1515110" y="4194313"/>
+            <a:ext cx="3215915" cy="1448478"/>
+          </a:xfrm>
+          <a:prstGeom prst="rect">
+            <a:avLst/>
+          </a:prstGeom>
+        </p:spPr>
+      </p:pic>
+      <p:pic>
+        <p:nvPicPr>
+          <p:cNvPr id="5" name="Picture 4">
+            <a:extLst>
+              <a:ext uri="{FF2B5EF4-FFF2-40B4-BE49-F238E27FC236}">
+                <a16:creationId xmlns:a16="http://schemas.microsoft.com/office/drawing/2014/main" id="{C6E85DA1-555E-B744-A727-D881BBE0CE83}"/>
+              </a:ext>
+            </a:extLst>
+          </p:cNvPr>
+          <p:cNvPicPr>
+            <a:picLocks noChangeAspect="1"/>
+          </p:cNvPicPr>
+          <p:nvPr/>
+        </p:nvPicPr>
+        <p:blipFill>
+          <a:blip r:embed="rId3"/>
+          <a:stretch>
+            <a:fillRect/>
+          </a:stretch>
+        </p:blipFill>
+        <p:spPr>
+          <a:xfrm>
+            <a:off x="6470374" y="3801290"/>
+            <a:ext cx="4611756" cy="2338531"/>
+          </a:xfrm>
+          <a:prstGeom prst="rect">
+            <a:avLst/>
+          </a:prstGeom>
+        </p:spPr>
+      </p:pic>
+    </p:spTree>
+    <p:extLst>
+      <p:ext uri="{BB962C8B-B14F-4D97-AF65-F5344CB8AC3E}">
+        <p14:creationId xmlns:p14="http://schemas.microsoft.com/office/powerpoint/2010/main" val="3536677981"/>
       </p:ext>
     </p:extLst>
   </p:cSld>
@@ -8021,7 +9083,7 @@
           <p:cNvPr id="2" name="Title 1">
             <a:extLst>
               <a:ext uri="{FF2B5EF4-FFF2-40B4-BE49-F238E27FC236}">
-                <a16:creationId xmlns:a16="http://schemas.microsoft.com/office/drawing/2014/main" id="{623A8048-FE58-DE46-8C7E-4A56C430364A}"/>
+                <a16:creationId xmlns:a16="http://schemas.microsoft.com/office/drawing/2014/main" id="{A5B2F18C-1EE7-4F49-9B65-DC8BC88E2185}"/>
               </a:ext>
             </a:extLst>
           </p:cNvPr>
@@ -8039,68 +9101,54 @@
           <a:p>
             <a:r>
               <a:rPr lang="en-US" b="1" dirty="0"/>
-              <a:t>TensorFlow Architecture</a:t>
-            </a:r>
-            <a:br>
-              <a:rPr lang="en-US" dirty="0"/>
-            </a:br>
-            <a:endParaRPr lang="en-US" dirty="0"/>
-          </a:p>
-        </p:txBody>
-      </p:sp>
-      <p:pic>
-        <p:nvPicPr>
-          <p:cNvPr id="1028" name="Picture 4" descr="TensorFlow Layers">
+              <a:t>What is </a:t>
+            </a:r>
+            <a:r>
+              <a:rPr lang="en-US" b="1" dirty="0" err="1"/>
+              <a:t>Keras</a:t>
+            </a:r>
+            <a:endParaRPr lang="en-US" b="1" dirty="0"/>
+          </a:p>
+        </p:txBody>
+      </p:sp>
+      <p:sp>
+        <p:nvSpPr>
+          <p:cNvPr id="3" name="Content Placeholder 2">
             <a:extLst>
               <a:ext uri="{FF2B5EF4-FFF2-40B4-BE49-F238E27FC236}">
-                <a16:creationId xmlns:a16="http://schemas.microsoft.com/office/drawing/2014/main" id="{85807BEA-CFEF-5C49-B204-F25431EF3554}"/>
+                <a16:creationId xmlns:a16="http://schemas.microsoft.com/office/drawing/2014/main" id="{28B8A1EF-3CB4-084C-B8E1-86B61277F477}"/>
               </a:ext>
             </a:extLst>
           </p:cNvPr>
-          <p:cNvPicPr>
-            <a:picLocks noGrp="1" noChangeAspect="1" noChangeArrowheads="1"/>
-          </p:cNvPicPr>
+          <p:cNvSpPr>
+            <a:spLocks noGrp="1"/>
+          </p:cNvSpPr>
           <p:nvPr>
             <p:ph idx="1"/>
           </p:nvPr>
-        </p:nvPicPr>
-        <p:blipFill>
-          <a:blip r:embed="rId2">
-            <a:extLst>
-              <a:ext uri="{28A0092B-C50C-407E-A947-70E740481C1C}">
-                <a14:useLocalDpi xmlns:a14="http://schemas.microsoft.com/office/drawing/2010/main" val="0"/>
-              </a:ext>
-            </a:extLst>
-          </a:blip>
-          <a:srcRect/>
-          <a:stretch>
-            <a:fillRect/>
-          </a:stretch>
-        </p:blipFill>
-        <p:spPr bwMode="auto">
-          <a:xfrm>
-            <a:off x="1927654" y="1507524"/>
-            <a:ext cx="8625016" cy="4979773"/>
-          </a:xfrm>
-          <a:prstGeom prst="rect">
-            <a:avLst/>
-          </a:prstGeom>
-          <a:noFill/>
-          <a:extLst>
-            <a:ext uri="{909E8E84-426E-40DD-AFC4-6F175D3DCCD1}">
-              <a14:hiddenFill xmlns:a14="http://schemas.microsoft.com/office/drawing/2010/main">
-                <a:solidFill>
-                  <a:srgbClr val="FFFFFF"/>
-                </a:solidFill>
-              </a14:hiddenFill>
-            </a:ext>
-          </a:extLst>
-        </p:spPr>
-      </p:pic>
+        </p:nvSpPr>
+        <p:spPr/>
+        <p:txBody>
+          <a:bodyPr>
+            <a:normAutofit/>
+          </a:bodyPr>
+          <a:lstStyle/>
+          <a:p>
+            <a:r>
+              <a:rPr lang="en-US" sz="2400" dirty="0" err="1"/>
+              <a:t>Keras</a:t>
+            </a:r>
+            <a:r>
+              <a:rPr lang="en-US" sz="2400" dirty="0"/>
+              <a:t> is one of the leading high-level neural networks APIs. It is written in Python and supports multiple back-end neural network computation engines.</a:t>
+            </a:r>
+          </a:p>
+        </p:txBody>
+      </p:sp>
     </p:spTree>
     <p:extLst>
       <p:ext uri="{BB962C8B-B14F-4D97-AF65-F5344CB8AC3E}">
-        <p14:creationId xmlns:p14="http://schemas.microsoft.com/office/powerpoint/2010/main" val="1083765472"/>
+        <p14:creationId xmlns:p14="http://schemas.microsoft.com/office/powerpoint/2010/main" val="1770640174"/>
       </p:ext>
     </p:extLst>
   </p:cSld>
@@ -8132,7 +9180,7 @@
           <p:cNvPr id="2" name="Title 1">
             <a:extLst>
               <a:ext uri="{FF2B5EF4-FFF2-40B4-BE49-F238E27FC236}">
-                <a16:creationId xmlns:a16="http://schemas.microsoft.com/office/drawing/2014/main" id="{A5B2F18C-1EE7-4F49-9B65-DC8BC88E2185}"/>
+                <a16:creationId xmlns:a16="http://schemas.microsoft.com/office/drawing/2014/main" id="{3CB9CC3D-4701-8E4A-A996-99310E780816}"/>
               </a:ext>
             </a:extLst>
           </p:cNvPr>
@@ -8149,14 +9197,13 @@
           <a:lstStyle/>
           <a:p>
             <a:r>
-              <a:rPr lang="en-US" b="1" dirty="0"/>
-              <a:t>What is </a:t>
-            </a:r>
-            <a:r>
               <a:rPr lang="en-US" b="1" dirty="0" err="1"/>
               <a:t>Keras</a:t>
             </a:r>
-            <a:endParaRPr lang="en-US" b="1" dirty="0"/>
+            <a:r>
+              <a:rPr lang="en-US" b="1" dirty="0"/>
+              <a:t> models</a:t>
+            </a:r>
           </a:p>
         </p:txBody>
       </p:sp>
@@ -8165,7 +9212,7 @@
           <p:cNvPr id="3" name="Content Placeholder 2">
             <a:extLst>
               <a:ext uri="{FF2B5EF4-FFF2-40B4-BE49-F238E27FC236}">
-                <a16:creationId xmlns:a16="http://schemas.microsoft.com/office/drawing/2014/main" id="{28B8A1EF-3CB4-084C-B8E1-86B61277F477}"/>
+                <a16:creationId xmlns:a16="http://schemas.microsoft.com/office/drawing/2014/main" id="{28FD67C9-C6CC-234E-B831-C4AECB024317}"/>
               </a:ext>
             </a:extLst>
           </p:cNvPr>
@@ -8179,25 +9226,103 @@
         <p:spPr/>
         <p:txBody>
           <a:bodyPr>
-            <a:normAutofit/>
+            <a:normAutofit lnSpcReduction="10000"/>
           </a:bodyPr>
           <a:lstStyle/>
           <a:p>
             <a:r>
+              <a:rPr lang="en-US" sz="2400" b="1" dirty="0" err="1"/>
+              <a:t>Keras</a:t>
+            </a:r>
+            <a:r>
+              <a:rPr lang="en-US" sz="2400" b="1" dirty="0"/>
+              <a:t> models</a:t>
+            </a:r>
+          </a:p>
+          <a:p>
+            <a:pPr marL="0" indent="0">
+              <a:buNone/>
+            </a:pPr>
+            <a:r>
+              <a:rPr lang="en-US" sz="2400" dirty="0"/>
+              <a:t>     The </a:t>
+            </a:r>
+            <a:r>
+              <a:rPr lang="en-US" sz="2400" b="1" dirty="0"/>
+              <a:t>Model</a:t>
+            </a:r>
+            <a:r>
+              <a:rPr lang="en-US" sz="2400" dirty="0"/>
+              <a:t> is the core </a:t>
+            </a:r>
+            <a:r>
               <a:rPr lang="en-US" sz="2400" dirty="0" err="1"/>
               <a:t>Keras</a:t>
             </a:r>
             <a:r>
               <a:rPr lang="en-US" sz="2400" dirty="0"/>
-              <a:t> is one of the leading high-level neural networks APIs. It is written in Python and supports multiple back-end neural network computation engines.</a:t>
-            </a:r>
+              <a:t> data structure. There are two models are available, (1) the </a:t>
+            </a:r>
+            <a:r>
+              <a:rPr lang="en-US" sz="2400" b="1" i="1" dirty="0"/>
+              <a:t>Sequential</a:t>
+            </a:r>
+            <a:r>
+              <a:rPr lang="en-US" sz="2400" dirty="0"/>
+              <a:t> model, and (2) the </a:t>
+            </a:r>
+            <a:r>
+              <a:rPr lang="en-US" sz="2400" b="1" i="1" dirty="0"/>
+              <a:t>Model</a:t>
+            </a:r>
+            <a:r>
+              <a:rPr lang="en-US" sz="2400" dirty="0"/>
+              <a:t> class used with the functional API.</a:t>
+            </a:r>
+          </a:p>
+          <a:p>
+            <a:pPr marL="0" indent="0">
+              <a:buNone/>
+            </a:pPr>
+            <a:endParaRPr lang="en-US" sz="2400" dirty="0"/>
+          </a:p>
+          <a:p>
+            <a:r>
+              <a:rPr lang="en-US" sz="2400" b="1" dirty="0" err="1"/>
+              <a:t>Keras</a:t>
+            </a:r>
+            <a:r>
+              <a:rPr lang="en-US" sz="2400" b="1" dirty="0"/>
+              <a:t> Sequential models</a:t>
+            </a:r>
+          </a:p>
+          <a:p>
+            <a:pPr marL="0" indent="0">
+              <a:buNone/>
+            </a:pPr>
+            <a:r>
+              <a:rPr lang="en-US" sz="2400" dirty="0"/>
+              <a:t>     The Sequential model is a linear stack of layers, and the layers can be described very simply. </a:t>
+            </a:r>
+          </a:p>
+          <a:p>
+            <a:pPr marL="0" indent="0">
+              <a:buNone/>
+            </a:pPr>
+            <a:r>
+              <a:rPr lang="en-US" sz="2400" dirty="0"/>
+              <a:t>      We used it in our workshop program.</a:t>
+            </a:r>
+          </a:p>
+          <a:p>
+            <a:endParaRPr lang="en-US" dirty="0"/>
           </a:p>
         </p:txBody>
       </p:sp>
     </p:spTree>
     <p:extLst>
       <p:ext uri="{BB962C8B-B14F-4D97-AF65-F5344CB8AC3E}">
-        <p14:creationId xmlns:p14="http://schemas.microsoft.com/office/powerpoint/2010/main" val="1770640174"/>
+        <p14:creationId xmlns:p14="http://schemas.microsoft.com/office/powerpoint/2010/main" val="1550801794"/>
       </p:ext>
     </p:extLst>
   </p:cSld>
@@ -8229,7 +9354,7 @@
           <p:cNvPr id="2" name="Title 1">
             <a:extLst>
               <a:ext uri="{FF2B5EF4-FFF2-40B4-BE49-F238E27FC236}">
-                <a16:creationId xmlns:a16="http://schemas.microsoft.com/office/drawing/2014/main" id="{44D4D694-6B63-064C-9E76-42162AFC1298}"/>
+                <a16:creationId xmlns:a16="http://schemas.microsoft.com/office/drawing/2014/main" id="{1AB0D858-BC28-734B-BF82-AC50B4A1F3A9}"/>
               </a:ext>
             </a:extLst>
           </p:cNvPr>
@@ -8246,9 +9371,17 @@
           <a:lstStyle/>
           <a:p>
             <a:r>
+              <a:rPr lang="en-US" b="1" dirty="0" err="1"/>
+              <a:t>Keras</a:t>
+            </a:r>
+            <a:r>
               <a:rPr lang="en-US" b="1" dirty="0"/>
-              <a:t>What are Neural Networks</a:t>
-            </a:r>
+              <a:t> layers</a:t>
+            </a:r>
+            <a:br>
+              <a:rPr lang="en-US" b="1" dirty="0"/>
+            </a:br>
+            <a:endParaRPr lang="en-US" dirty="0"/>
           </a:p>
         </p:txBody>
       </p:sp>
@@ -8257,7 +9390,7 @@
           <p:cNvPr id="3" name="Content Placeholder 2">
             <a:extLst>
               <a:ext uri="{FF2B5EF4-FFF2-40B4-BE49-F238E27FC236}">
-                <a16:creationId xmlns:a16="http://schemas.microsoft.com/office/drawing/2014/main" id="{BFDE4A8F-13C0-4F40-BDA2-541596D7F0AF}"/>
+                <a16:creationId xmlns:a16="http://schemas.microsoft.com/office/drawing/2014/main" id="{9122D436-C11F-8C44-B1CF-A9A74C41D5A0}"/>
               </a:ext>
             </a:extLst>
           </p:cNvPr>
@@ -8268,81 +9401,32 @@
             <p:ph idx="1"/>
           </p:nvPr>
         </p:nvSpPr>
-        <p:spPr>
-          <a:xfrm>
-            <a:off x="1818861" y="2146852"/>
-            <a:ext cx="9685751" cy="4087038"/>
-          </a:xfrm>
-        </p:spPr>
+        <p:spPr/>
         <p:txBody>
           <a:bodyPr>
-            <a:normAutofit lnSpcReduction="10000"/>
+            <a:normAutofit/>
           </a:bodyPr>
           <a:lstStyle/>
           <a:p>
             <a:r>
+              <a:rPr lang="en-US" sz="2400" dirty="0" err="1"/>
+              <a:t>Keras</a:t>
+            </a:r>
+            <a:r>
               <a:rPr lang="en-US" sz="2400" dirty="0"/>
-              <a:t>Neural networks are a set of </a:t>
-            </a:r>
-            <a:r>
-              <a:rPr lang="en-US" sz="2400" b="1" i="1" dirty="0"/>
-              <a:t>algorithms</a:t>
-            </a:r>
+              <a:t> has a wide selection of predefined layer types, and also supports writing your own layers.</a:t>
+            </a:r>
+          </a:p>
+          <a:p>
+            <a:pPr marL="0" indent="0">
+              <a:buNone/>
+            </a:pPr>
+            <a:endParaRPr lang="en-US" sz="2400" dirty="0"/>
+          </a:p>
+          <a:p>
             <a:r>
               <a:rPr lang="en-US" sz="2400" dirty="0"/>
-              <a:t>, modeled loosely after the human brain, that are designed to </a:t>
-            </a:r>
-            <a:r>
-              <a:rPr lang="en-US" sz="2400" b="1" i="1" dirty="0"/>
-              <a:t>recognize patterns</a:t>
-            </a:r>
-            <a:r>
-              <a:rPr lang="en-US" sz="2400" dirty="0"/>
-              <a:t>. They interpret sensory data through a kind of machine perception, labeling or clustering raw </a:t>
-            </a:r>
-            <a:r>
-              <a:rPr lang="en-US" sz="2400" i="1" u="sng" dirty="0"/>
-              <a:t>input</a:t>
-            </a:r>
-            <a:r>
-              <a:rPr lang="en-US" sz="2400" dirty="0"/>
-              <a:t>. The </a:t>
-            </a:r>
-            <a:r>
-              <a:rPr lang="en-US" sz="2400" i="1" u="sng" dirty="0"/>
-              <a:t>patterns</a:t>
-            </a:r>
-            <a:r>
-              <a:rPr lang="en-US" sz="2400" dirty="0"/>
-              <a:t> they recognize are numerical, contained in </a:t>
-            </a:r>
-            <a:r>
-              <a:rPr lang="en-US" sz="2400" i="1" u="sng" dirty="0"/>
-              <a:t>vectors</a:t>
-            </a:r>
-            <a:r>
-              <a:rPr lang="en-US" sz="2400" dirty="0"/>
-              <a:t>, into which all real-world data, be it images, sound, text or time series, must be translated.</a:t>
-            </a:r>
-          </a:p>
-          <a:p>
-            <a:endParaRPr lang="en-US" sz="2400" dirty="0"/>
-          </a:p>
-          <a:p>
-            <a:endParaRPr lang="en-US" sz="2400" dirty="0"/>
-          </a:p>
-          <a:p>
-            <a:r>
-              <a:rPr lang="en-US" sz="2400" dirty="0"/>
-              <a:t>Neural networks help us </a:t>
-            </a:r>
-            <a:r>
-              <a:rPr lang="en-US" sz="2400" i="1" u="sng" dirty="0"/>
-              <a:t>cluster and classify</a:t>
-            </a:r>
-            <a:r>
-              <a:rPr lang="en-US" sz="2400" dirty="0"/>
-              <a:t>. </a:t>
+              <a:t>Core layers include Dense (dot product plus bias), Activation (transfer function or neuron shape), Dropout (randomly set a fraction of input units to 0 at each training update to avoid overfitting), Lambda (wrap an arbitrary expression as a Layer object), and several others. </a:t>
             </a:r>
           </a:p>
           <a:p>
@@ -8356,7 +9440,7 @@
     </p:spTree>
     <p:extLst>
       <p:ext uri="{BB962C8B-B14F-4D97-AF65-F5344CB8AC3E}">
-        <p14:creationId xmlns:p14="http://schemas.microsoft.com/office/powerpoint/2010/main" val="3143733291"/>
+        <p14:creationId xmlns:p14="http://schemas.microsoft.com/office/powerpoint/2010/main" val="1190275087"/>
       </p:ext>
     </p:extLst>
   </p:cSld>
@@ -8388,7 +9472,7 @@
           <p:cNvPr id="2" name="Title 1">
             <a:extLst>
               <a:ext uri="{FF2B5EF4-FFF2-40B4-BE49-F238E27FC236}">
-                <a16:creationId xmlns:a16="http://schemas.microsoft.com/office/drawing/2014/main" id="{14A25140-FDCB-E442-A567-749585DED29C}"/>
+                <a16:creationId xmlns:a16="http://schemas.microsoft.com/office/drawing/2014/main" id="{6ABE32CE-4722-8445-B270-1ABF2A108399}"/>
               </a:ext>
             </a:extLst>
           </p:cNvPr>
@@ -8406,20 +9490,8 @@
           <a:p>
             <a:r>
               <a:rPr lang="en-US" b="1" dirty="0"/>
-              <a:t>Example of Neural Network Elements</a:t>
-            </a:r>
-            <a:br>
-              <a:rPr lang="en-US" b="1" dirty="0"/>
-            </a:br>
-            <a:r>
-              <a:rPr lang="en-US" b="1" dirty="0"/>
-              <a:t>-</a:t>
-            </a:r>
-            <a:r>
-              <a:rPr lang="en-US" dirty="0"/>
-              <a:t>stacked neural networks</a:t>
-            </a:r>
-            <a:endParaRPr lang="en-US" b="1" dirty="0"/>
+              <a:t>Convolution Layer</a:t>
+            </a:r>
           </a:p>
         </p:txBody>
       </p:sp>
@@ -8428,7 +9500,7 @@
           <p:cNvPr id="3" name="Content Placeholder 2">
             <a:extLst>
               <a:ext uri="{FF2B5EF4-FFF2-40B4-BE49-F238E27FC236}">
-                <a16:creationId xmlns:a16="http://schemas.microsoft.com/office/drawing/2014/main" id="{F7FA9198-83C7-EB4B-A708-0F262BE49922}"/>
+                <a16:creationId xmlns:a16="http://schemas.microsoft.com/office/drawing/2014/main" id="{C74A1B5E-BD55-3342-89D7-F685D953B7A5}"/>
               </a:ext>
             </a:extLst>
           </p:cNvPr>
@@ -8441,43 +9513,31 @@
         </p:nvSpPr>
         <p:spPr>
           <a:xfrm>
-            <a:off x="1791729" y="2133599"/>
-            <a:ext cx="10083113" cy="4341341"/>
+            <a:off x="2509699" y="1739348"/>
+            <a:ext cx="8915400" cy="4830417"/>
           </a:xfrm>
         </p:spPr>
         <p:txBody>
-          <a:bodyPr/>
+          <a:bodyPr>
+            <a:normAutofit fontScale="92500" lnSpcReduction="20000"/>
+          </a:bodyPr>
           <a:lstStyle/>
           <a:p>
             <a:r>
               <a:rPr lang="en-US" sz="2400" dirty="0"/>
-              <a:t> Networks composed of several layers.</a:t>
-            </a:r>
-          </a:p>
-          <a:p>
+              <a:t>Convolution layers (the use of a filter to create a feature map) run from 1D to 3D and include the most common variants, such as cropping and transposed convolution layers for each dimensionality. 2D convolution, which was inspired by the functionality of the visual cortex, is commonly used for image recognition.</a:t>
+            </a:r>
+          </a:p>
+          <a:p>
+            <a:pPr marL="0" indent="0">
+              <a:buNone/>
+            </a:pPr>
             <a:endParaRPr lang="en-US" sz="2400" dirty="0"/>
           </a:p>
           <a:p>
             <a:r>
               <a:rPr lang="en-US" sz="2400" dirty="0"/>
-              <a:t>The layers are made of </a:t>
-            </a:r>
-            <a:r>
-              <a:rPr lang="en-US" sz="2400" i="1" dirty="0"/>
-              <a:t>nodes</a:t>
-            </a:r>
-            <a:r>
-              <a:rPr lang="en-US" sz="2400" dirty="0"/>
-              <a:t>.</a:t>
-            </a:r>
-          </a:p>
-          <a:p>
-            <a:endParaRPr lang="en-US" sz="2400" dirty="0"/>
-          </a:p>
-          <a:p>
-            <a:r>
-              <a:rPr lang="en-US" sz="2400" dirty="0"/>
-              <a:t>A node is just a place where computation happens, loosely patterned on a neuron in the human brain, which fires when it encounters sufficient stimuli. A node combines input from the data with a set of coefficients, or weights, that either amplify or dampen that input, thereby assigning significance to inputs with regard to the task the algorithm is trying to learn.</a:t>
+              <a:t>Pooling (downscaling) layers run from 1D to 3D and include the most common variants, such as max and average pooling. Locally connected layers act like convolution layers, except that the weights are unshared. Recurrent layers include simple (fully connected recurrence), gated, LSTM(long-short-time memory), and others; these are useful for language processing, among other applications. Noise layers help to avoid overfitting.</a:t>
             </a:r>
           </a:p>
           <a:p>
@@ -8488,7 +9548,7 @@
     </p:spTree>
     <p:extLst>
       <p:ext uri="{BB962C8B-B14F-4D97-AF65-F5344CB8AC3E}">
-        <p14:creationId xmlns:p14="http://schemas.microsoft.com/office/powerpoint/2010/main" val="2474191470"/>
+        <p14:creationId xmlns:p14="http://schemas.microsoft.com/office/powerpoint/2010/main" val="1539290060"/>
       </p:ext>
     </p:extLst>
   </p:cSld>
@@ -8520,7 +9580,7 @@
           <p:cNvPr id="2" name="Title 1">
             <a:extLst>
               <a:ext uri="{FF2B5EF4-FFF2-40B4-BE49-F238E27FC236}">
-                <a16:creationId xmlns:a16="http://schemas.microsoft.com/office/drawing/2014/main" id="{8B0576B1-52B9-D14D-9D3F-922BF7433495}"/>
+                <a16:creationId xmlns:a16="http://schemas.microsoft.com/office/drawing/2014/main" id="{44D4D694-6B63-064C-9E76-42162AFC1298}"/>
               </a:ext>
             </a:extLst>
           </p:cNvPr>
@@ -8538,14 +9598,7 @@
           <a:p>
             <a:r>
               <a:rPr lang="en-US" b="1" dirty="0"/>
-              <a:t>Neural Network</a:t>
-            </a:r>
-            <a:br>
-              <a:rPr lang="en-US" b="1" dirty="0"/>
-            </a:br>
-            <a:r>
-              <a:rPr lang="en-US" b="1" dirty="0"/>
-              <a:t>-Continue</a:t>
+              <a:t>What are Neural Networks</a:t>
             </a:r>
           </a:p>
         </p:txBody>
@@ -8555,7 +9608,7 @@
           <p:cNvPr id="3" name="Content Placeholder 2">
             <a:extLst>
               <a:ext uri="{FF2B5EF4-FFF2-40B4-BE49-F238E27FC236}">
-                <a16:creationId xmlns:a16="http://schemas.microsoft.com/office/drawing/2014/main" id="{6B5A1497-C8D6-3F42-8BB7-12654E52E2CE}"/>
+                <a16:creationId xmlns:a16="http://schemas.microsoft.com/office/drawing/2014/main" id="{BFDE4A8F-13C0-4F40-BDA2-541596D7F0AF}"/>
               </a:ext>
             </a:extLst>
           </p:cNvPr>
@@ -8568,85 +9621,93 @@
         </p:nvSpPr>
         <p:spPr>
           <a:xfrm>
-            <a:off x="259492" y="2133600"/>
-            <a:ext cx="11245120" cy="3777622"/>
+            <a:off x="1818861" y="2146852"/>
+            <a:ext cx="9685751" cy="4087038"/>
           </a:xfrm>
         </p:spPr>
         <p:txBody>
-          <a:bodyPr/>
+          <a:bodyPr>
+            <a:normAutofit lnSpcReduction="10000"/>
+          </a:bodyPr>
           <a:lstStyle/>
           <a:p>
             <a:r>
-              <a:rPr lang="en-US" dirty="0"/>
-              <a:t>Nodes and Layers</a:t>
-            </a:r>
-          </a:p>
-        </p:txBody>
-      </p:sp>
-      <p:pic>
-        <p:nvPicPr>
-          <p:cNvPr id="4" name="Picture 3">
-            <a:extLst>
-              <a:ext uri="{FF2B5EF4-FFF2-40B4-BE49-F238E27FC236}">
-                <a16:creationId xmlns:a16="http://schemas.microsoft.com/office/drawing/2014/main" id="{9FE17D89-152D-B642-99CF-65D0892365DF}"/>
-              </a:ext>
-            </a:extLst>
-          </p:cNvPr>
-          <p:cNvPicPr>
-            <a:picLocks noChangeAspect="1"/>
-          </p:cNvPicPr>
-          <p:nvPr/>
-        </p:nvPicPr>
-        <p:blipFill>
-          <a:blip r:embed="rId2"/>
-          <a:stretch>
-            <a:fillRect/>
-          </a:stretch>
-        </p:blipFill>
-        <p:spPr>
-          <a:xfrm>
-            <a:off x="259493" y="2829699"/>
-            <a:ext cx="6598508" cy="2792626"/>
-          </a:xfrm>
-          <a:prstGeom prst="rect">
-            <a:avLst/>
-          </a:prstGeom>
-        </p:spPr>
-      </p:pic>
-      <p:pic>
-        <p:nvPicPr>
-          <p:cNvPr id="5" name="Picture 4">
-            <a:extLst>
-              <a:ext uri="{FF2B5EF4-FFF2-40B4-BE49-F238E27FC236}">
-                <a16:creationId xmlns:a16="http://schemas.microsoft.com/office/drawing/2014/main" id="{E18D968F-A88D-F44A-9398-28FDFFF0EAA9}"/>
-              </a:ext>
-            </a:extLst>
-          </p:cNvPr>
-          <p:cNvPicPr>
-            <a:picLocks noChangeAspect="1"/>
-          </p:cNvPicPr>
-          <p:nvPr/>
-        </p:nvPicPr>
-        <p:blipFill>
-          <a:blip r:embed="rId3"/>
-          <a:stretch>
-            <a:fillRect/>
-          </a:stretch>
-        </p:blipFill>
-        <p:spPr>
-          <a:xfrm>
-            <a:off x="7371556" y="2829699"/>
-            <a:ext cx="3619500" cy="2792626"/>
-          </a:xfrm>
-          <a:prstGeom prst="rect">
-            <a:avLst/>
-          </a:prstGeom>
-        </p:spPr>
-      </p:pic>
+              <a:rPr lang="en-US" sz="2400" dirty="0"/>
+              <a:t>Neural networks are a set of </a:t>
+            </a:r>
+            <a:r>
+              <a:rPr lang="en-US" sz="2400" b="1" i="1" dirty="0"/>
+              <a:t>algorithms</a:t>
+            </a:r>
+            <a:r>
+              <a:rPr lang="en-US" sz="2400" dirty="0"/>
+              <a:t>, modeled loosely after the human brain, that are designed to </a:t>
+            </a:r>
+            <a:r>
+              <a:rPr lang="en-US" sz="2400" b="1" i="1" dirty="0"/>
+              <a:t>recognize patterns</a:t>
+            </a:r>
+            <a:r>
+              <a:rPr lang="en-US" sz="2400" dirty="0"/>
+              <a:t>. They interpret sensory data through a kind of machine perception, labeling or clustering raw </a:t>
+            </a:r>
+            <a:r>
+              <a:rPr lang="en-US" sz="2400" i="1" u="sng" dirty="0"/>
+              <a:t>input</a:t>
+            </a:r>
+            <a:r>
+              <a:rPr lang="en-US" sz="2400" dirty="0"/>
+              <a:t>. The </a:t>
+            </a:r>
+            <a:r>
+              <a:rPr lang="en-US" sz="2400" i="1" u="sng" dirty="0"/>
+              <a:t>patterns</a:t>
+            </a:r>
+            <a:r>
+              <a:rPr lang="en-US" sz="2400" dirty="0"/>
+              <a:t> they recognize are numerical, contained in </a:t>
+            </a:r>
+            <a:r>
+              <a:rPr lang="en-US" sz="2400" i="1" u="sng" dirty="0"/>
+              <a:t>vectors</a:t>
+            </a:r>
+            <a:r>
+              <a:rPr lang="en-US" sz="2400" dirty="0"/>
+              <a:t>, into which all real-world data, be it images, sound, text or time series, must be translated.</a:t>
+            </a:r>
+          </a:p>
+          <a:p>
+            <a:endParaRPr lang="en-US" sz="2400" dirty="0"/>
+          </a:p>
+          <a:p>
+            <a:endParaRPr lang="en-US" sz="2400" dirty="0"/>
+          </a:p>
+          <a:p>
+            <a:r>
+              <a:rPr lang="en-US" sz="2400" dirty="0"/>
+              <a:t>Neural networks help us </a:t>
+            </a:r>
+            <a:r>
+              <a:rPr lang="en-US" sz="2400" i="1" u="sng" dirty="0"/>
+              <a:t>cluster and classify</a:t>
+            </a:r>
+            <a:r>
+              <a:rPr lang="en-US" sz="2400" dirty="0"/>
+              <a:t>. </a:t>
+            </a:r>
+          </a:p>
+          <a:p>
+            <a:pPr marL="0" indent="0">
+              <a:buNone/>
+            </a:pPr>
+            <a:endParaRPr lang="en-US" dirty="0"/>
+          </a:p>
+        </p:txBody>
+      </p:sp>
     </p:spTree>
     <p:extLst>
       <p:ext uri="{BB962C8B-B14F-4D97-AF65-F5344CB8AC3E}">
-        <p14:creationId xmlns:p14="http://schemas.microsoft.com/office/powerpoint/2010/main" val="2783629597"/>
+        <p14:creationId xmlns:p14="http://schemas.microsoft.com/office/powerpoint/2010/main" val="3143733291"/>
       </p:ext>
     </p:extLst>
   </p:cSld>
@@ -8678,7 +9739,7 @@
           <p:cNvPr id="2" name="Title 1">
             <a:extLst>
               <a:ext uri="{FF2B5EF4-FFF2-40B4-BE49-F238E27FC236}">
-                <a16:creationId xmlns:a16="http://schemas.microsoft.com/office/drawing/2014/main" id="{3CB9CC3D-4701-8E4A-A996-99310E780816}"/>
+                <a16:creationId xmlns:a16="http://schemas.microsoft.com/office/drawing/2014/main" id="{14A25140-FDCB-E442-A567-749585DED29C}"/>
               </a:ext>
             </a:extLst>
           </p:cNvPr>
@@ -8695,13 +9756,21 @@
           <a:lstStyle/>
           <a:p>
             <a:r>
-              <a:rPr lang="en-US" dirty="0" err="1"/>
-              <a:t>Keras</a:t>
+              <a:rPr lang="en-US" b="1" dirty="0"/>
+              <a:t>Example of Neural Network Elements</a:t>
+            </a:r>
+            <a:br>
+              <a:rPr lang="en-US" b="1" dirty="0"/>
+            </a:br>
+            <a:r>
+              <a:rPr lang="en-US" b="1" dirty="0"/>
+              <a:t>-</a:t>
             </a:r>
             <a:r>
               <a:rPr lang="en-US" dirty="0"/>
-              <a:t> models</a:t>
-            </a:r>
+              <a:t>stacked neural networks</a:t>
+            </a:r>
+            <a:endParaRPr lang="en-US" b="1" dirty="0"/>
           </a:p>
         </p:txBody>
       </p:sp>
@@ -8710,7 +9779,7 @@
           <p:cNvPr id="3" name="Content Placeholder 2">
             <a:extLst>
               <a:ext uri="{FF2B5EF4-FFF2-40B4-BE49-F238E27FC236}">
-                <a16:creationId xmlns:a16="http://schemas.microsoft.com/office/drawing/2014/main" id="{28FD67C9-C6CC-234E-B831-C4AECB024317}"/>
+                <a16:creationId xmlns:a16="http://schemas.microsoft.com/office/drawing/2014/main" id="{F7FA9198-83C7-EB4B-A708-0F262BE49922}"/>
               </a:ext>
             </a:extLst>
           </p:cNvPr>
@@ -8721,95 +9790,45 @@
             <p:ph idx="1"/>
           </p:nvPr>
         </p:nvSpPr>
-        <p:spPr/>
-        <p:txBody>
-          <a:bodyPr>
-            <a:normAutofit lnSpcReduction="10000"/>
-          </a:bodyPr>
+        <p:spPr>
+          <a:xfrm>
+            <a:off x="1791729" y="2133599"/>
+            <a:ext cx="10083113" cy="4341341"/>
+          </a:xfrm>
+        </p:spPr>
+        <p:txBody>
+          <a:bodyPr/>
           <a:lstStyle/>
           <a:p>
             <a:r>
-              <a:rPr lang="en-US" sz="2400" b="1" dirty="0" err="1"/>
-              <a:t>Keras</a:t>
-            </a:r>
-            <a:r>
-              <a:rPr lang="en-US" sz="2400" b="1" dirty="0"/>
-              <a:t> models</a:t>
-            </a:r>
-          </a:p>
-          <a:p>
-            <a:pPr marL="0" indent="0">
-              <a:buNone/>
-            </a:pPr>
-            <a:r>
               <a:rPr lang="en-US" sz="2400" dirty="0"/>
-              <a:t>     The </a:t>
-            </a:r>
-            <a:r>
-              <a:rPr lang="en-US" sz="2400" b="1" dirty="0"/>
-              <a:t>Model</a:t>
-            </a:r>
+              <a:t> Networks composed of several layers.</a:t>
+            </a:r>
+          </a:p>
+          <a:p>
+            <a:endParaRPr lang="en-US" sz="2400" dirty="0"/>
+          </a:p>
+          <a:p>
             <a:r>
               <a:rPr lang="en-US" sz="2400" dirty="0"/>
-              <a:t> is the core </a:t>
-            </a:r>
-            <a:r>
-              <a:rPr lang="en-US" sz="2400" dirty="0" err="1"/>
-              <a:t>Keras</a:t>
+              <a:t>The layers are made of </a:t>
+            </a:r>
+            <a:r>
+              <a:rPr lang="en-US" sz="2400" i="1" dirty="0"/>
+              <a:t>nodes</a:t>
             </a:r>
             <a:r>
               <a:rPr lang="en-US" sz="2400" dirty="0"/>
-              <a:t> data structure. There are two models are available, (1) the </a:t>
-            </a:r>
-            <a:r>
-              <a:rPr lang="en-US" sz="2400" b="1" i="1" dirty="0"/>
-              <a:t>Sequential</a:t>
-            </a:r>
+              <a:t>.</a:t>
+            </a:r>
+          </a:p>
+          <a:p>
+            <a:endParaRPr lang="en-US" sz="2400" dirty="0"/>
+          </a:p>
+          <a:p>
             <a:r>
               <a:rPr lang="en-US" sz="2400" dirty="0"/>
-              <a:t> model, and (2) the </a:t>
-            </a:r>
-            <a:r>
-              <a:rPr lang="en-US" sz="2400" b="1" i="1" dirty="0"/>
-              <a:t>Model</a:t>
-            </a:r>
-            <a:r>
-              <a:rPr lang="en-US" sz="2400" dirty="0"/>
-              <a:t> class used with the functional API.</a:t>
-            </a:r>
-          </a:p>
-          <a:p>
-            <a:pPr marL="0" indent="0">
-              <a:buNone/>
-            </a:pPr>
-            <a:endParaRPr lang="en-US" sz="2400" dirty="0"/>
-          </a:p>
-          <a:p>
-            <a:r>
-              <a:rPr lang="en-US" sz="2400" b="1" dirty="0" err="1"/>
-              <a:t>Keras</a:t>
-            </a:r>
-            <a:r>
-              <a:rPr lang="en-US" sz="2400" b="1" dirty="0"/>
-              <a:t> Sequential models</a:t>
-            </a:r>
-          </a:p>
-          <a:p>
-            <a:pPr marL="0" indent="0">
-              <a:buNone/>
-            </a:pPr>
-            <a:r>
-              <a:rPr lang="en-US" sz="2400" dirty="0"/>
-              <a:t>     The Sequential model is a linear stack of layers, and the layers can be described very simply. </a:t>
-            </a:r>
-          </a:p>
-          <a:p>
-            <a:pPr marL="0" indent="0">
-              <a:buNone/>
-            </a:pPr>
-            <a:r>
-              <a:rPr lang="en-US" sz="2400" dirty="0"/>
-              <a:t>      We used it in our workshop program.</a:t>
+              <a:t>A node is just a place where computation happens. A node combines input from the data with a set of coefficients, or weights, that either amplify or dampen that input, thereby assigning significance to inputs with regard to the task the algorithm is trying to learn.</a:t>
             </a:r>
           </a:p>
           <a:p>
@@ -8820,7 +9839,7 @@
     </p:spTree>
     <p:extLst>
       <p:ext uri="{BB962C8B-B14F-4D97-AF65-F5344CB8AC3E}">
-        <p14:creationId xmlns:p14="http://schemas.microsoft.com/office/powerpoint/2010/main" val="1550801794"/>
+        <p14:creationId xmlns:p14="http://schemas.microsoft.com/office/powerpoint/2010/main" val="2474191470"/>
       </p:ext>
     </p:extLst>
   </p:cSld>
@@ -8852,7 +9871,7 @@
           <p:cNvPr id="2" name="Title 1">
             <a:extLst>
               <a:ext uri="{FF2B5EF4-FFF2-40B4-BE49-F238E27FC236}">
-                <a16:creationId xmlns:a16="http://schemas.microsoft.com/office/drawing/2014/main" id="{1AB0D858-BC28-734B-BF82-AC50B4A1F3A9}"/>
+                <a16:creationId xmlns:a16="http://schemas.microsoft.com/office/drawing/2014/main" id="{8B0576B1-52B9-D14D-9D3F-922BF7433495}"/>
               </a:ext>
             </a:extLst>
           </p:cNvPr>
@@ -8869,17 +9888,16 @@
           <a:lstStyle/>
           <a:p>
             <a:r>
-              <a:rPr lang="en-US" b="1" dirty="0" err="1"/>
-              <a:t>Keras</a:t>
-            </a:r>
-            <a:r>
               <a:rPr lang="en-US" b="1" dirty="0"/>
-              <a:t> layers</a:t>
+              <a:t>A Basic Neural Network</a:t>
             </a:r>
             <a:br>
               <a:rPr lang="en-US" b="1" dirty="0"/>
             </a:br>
-            <a:endParaRPr lang="en-US" dirty="0"/>
+            <a:r>
+              <a:rPr lang="en-US" b="1" dirty="0"/>
+              <a:t>-Continue</a:t>
+            </a:r>
           </a:p>
         </p:txBody>
       </p:sp>
@@ -8888,7 +9906,7 @@
           <p:cNvPr id="3" name="Content Placeholder 2">
             <a:extLst>
               <a:ext uri="{FF2B5EF4-FFF2-40B4-BE49-F238E27FC236}">
-                <a16:creationId xmlns:a16="http://schemas.microsoft.com/office/drawing/2014/main" id="{9122D436-C11F-8C44-B1CF-A9A74C41D5A0}"/>
+                <a16:creationId xmlns:a16="http://schemas.microsoft.com/office/drawing/2014/main" id="{6B5A1497-C8D6-3F42-8BB7-12654E52E2CE}"/>
               </a:ext>
             </a:extLst>
           </p:cNvPr>
@@ -8899,46 +9917,87 @@
             <p:ph idx="1"/>
           </p:nvPr>
         </p:nvSpPr>
-        <p:spPr/>
-        <p:txBody>
-          <a:bodyPr>
-            <a:normAutofit/>
-          </a:bodyPr>
+        <p:spPr>
+          <a:xfrm>
+            <a:off x="259492" y="2133600"/>
+            <a:ext cx="11245120" cy="3777622"/>
+          </a:xfrm>
+        </p:spPr>
+        <p:txBody>
+          <a:bodyPr/>
           <a:lstStyle/>
           <a:p>
             <a:r>
-              <a:rPr lang="en-US" sz="2400" dirty="0" err="1"/>
-              <a:t>Keras</a:t>
-            </a:r>
-            <a:r>
-              <a:rPr lang="en-US" sz="2400" dirty="0"/>
-              <a:t> has a wide selection of predefined layer types, and also supports writing your own layers.</a:t>
-            </a:r>
-          </a:p>
-          <a:p>
-            <a:pPr marL="0" indent="0">
-              <a:buNone/>
-            </a:pPr>
-            <a:endParaRPr lang="en-US" sz="2400" dirty="0"/>
-          </a:p>
-          <a:p>
-            <a:r>
-              <a:rPr lang="en-US" sz="2400" dirty="0"/>
-              <a:t>Core layers include Dense (dot product plus bias), Activation (transfer function or neuron shape), Dropout (randomly set a fraction of input units to 0 at each training update to avoid overfitting), Lambda (wrap an arbitrary expression as a Layer object), and several others. </a:t>
-            </a:r>
-          </a:p>
-          <a:p>
-            <a:pPr marL="0" indent="0">
-              <a:buNone/>
-            </a:pPr>
-            <a:endParaRPr lang="en-US" dirty="0"/>
-          </a:p>
-        </p:txBody>
-      </p:sp>
+              <a:rPr lang="en-US" dirty="0"/>
+              <a:t>Nodes and Layers</a:t>
+            </a:r>
+          </a:p>
+        </p:txBody>
+      </p:sp>
+      <p:pic>
+        <p:nvPicPr>
+          <p:cNvPr id="4" name="Picture 3">
+            <a:extLst>
+              <a:ext uri="{FF2B5EF4-FFF2-40B4-BE49-F238E27FC236}">
+                <a16:creationId xmlns:a16="http://schemas.microsoft.com/office/drawing/2014/main" id="{9FE17D89-152D-B642-99CF-65D0892365DF}"/>
+              </a:ext>
+            </a:extLst>
+          </p:cNvPr>
+          <p:cNvPicPr>
+            <a:picLocks noChangeAspect="1"/>
+          </p:cNvPicPr>
+          <p:nvPr/>
+        </p:nvPicPr>
+        <p:blipFill>
+          <a:blip r:embed="rId2"/>
+          <a:stretch>
+            <a:fillRect/>
+          </a:stretch>
+        </p:blipFill>
+        <p:spPr>
+          <a:xfrm>
+            <a:off x="259492" y="3118596"/>
+            <a:ext cx="5025704" cy="2792626"/>
+          </a:xfrm>
+          <a:prstGeom prst="rect">
+            <a:avLst/>
+          </a:prstGeom>
+        </p:spPr>
+      </p:pic>
+      <p:pic>
+        <p:nvPicPr>
+          <p:cNvPr id="6" name="Picture 5">
+            <a:extLst>
+              <a:ext uri="{FF2B5EF4-FFF2-40B4-BE49-F238E27FC236}">
+                <a16:creationId xmlns:a16="http://schemas.microsoft.com/office/drawing/2014/main" id="{A0A613BD-BD74-5346-8770-F7C9F039CEE6}"/>
+              </a:ext>
+            </a:extLst>
+          </p:cNvPr>
+          <p:cNvPicPr>
+            <a:picLocks noChangeAspect="1"/>
+          </p:cNvPicPr>
+          <p:nvPr/>
+        </p:nvPicPr>
+        <p:blipFill>
+          <a:blip r:embed="rId3"/>
+          <a:stretch>
+            <a:fillRect/>
+          </a:stretch>
+        </p:blipFill>
+        <p:spPr>
+          <a:xfrm>
+            <a:off x="5285196" y="1905000"/>
+            <a:ext cx="6794500" cy="4787900"/>
+          </a:xfrm>
+          <a:prstGeom prst="rect">
+            <a:avLst/>
+          </a:prstGeom>
+        </p:spPr>
+      </p:pic>
     </p:spTree>
     <p:extLst>
       <p:ext uri="{BB962C8B-B14F-4D97-AF65-F5344CB8AC3E}">
-        <p14:creationId xmlns:p14="http://schemas.microsoft.com/office/powerpoint/2010/main" val="1190275087"/>
+        <p14:creationId xmlns:p14="http://schemas.microsoft.com/office/powerpoint/2010/main" val="2783629597"/>
       </p:ext>
     </p:extLst>
   </p:cSld>

</xml_diff>